<commit_message>
Added healthGain.mp3 file (prior missing)
</commit_message>
<xml_diff>
--- a/Reference Documents/Week 4.pptx
+++ b/Reference Documents/Week 4.pptx
@@ -9,7 +9,6 @@
     <p:sldId id="259" r:id="rId3"/>
     <p:sldId id="260" r:id="rId4"/>
     <p:sldId id="261" r:id="rId5"/>
-    <p:sldId id="262" r:id="rId6"/>
   </p:sldIdLst>
   <p:sldSz cx="12192000" cy="6858000"/>
   <p:notesSz cx="6858000" cy="9144000"/>
@@ -119,7 +118,7 @@
 <file path=ppt/revisionInfo.xml><?xml version="1.0" encoding="utf-8"?>
 <p1510:revInfo xmlns:a="http://schemas.openxmlformats.org/drawingml/2006/main" xmlns:r="http://schemas.openxmlformats.org/officeDocument/2006/relationships" xmlns:p1510="http://schemas.microsoft.com/office/powerpoint/2015/10/main">
   <p1510:revLst>
-    <p1510:client id="{37F4E37D-70FD-4C21-B8A2-BCB10CBCA044}" v="17" dt="2021-02-28T20:49:01.811"/>
+    <p1510:client id="{37F4E37D-70FD-4C21-B8A2-BCB10CBCA044}" v="31" dt="2021-03-07T21:50:18.856"/>
   </p1510:revLst>
 </p1510:revInfo>
 </file>
@@ -128,19 +127,19 @@
 <pc:chgInfo xmlns:a="http://schemas.openxmlformats.org/drawingml/2006/main" xmlns:r="http://schemas.openxmlformats.org/officeDocument/2006/relationships" xmlns:ac="http://schemas.microsoft.com/office/drawing/2013/main/command" xmlns:pc="http://schemas.microsoft.com/office/powerpoint/2013/main/command">
   <pc:docChgLst>
     <pc:chgData name="Vince McKeown" userId="31f1b572cc8f689e" providerId="LiveId" clId="{37F4E37D-70FD-4C21-B8A2-BCB10CBCA044}"/>
-    <pc:docChg chg="undo custSel addSld modSld">
-      <pc:chgData name="Vince McKeown" userId="31f1b572cc8f689e" providerId="LiveId" clId="{37F4E37D-70FD-4C21-B8A2-BCB10CBCA044}" dt="2021-02-28T20:51:08.029" v="287" actId="20577"/>
+    <pc:docChg chg="undo custSel addSld delSld modSld">
+      <pc:chgData name="Vince McKeown" userId="31f1b572cc8f689e" providerId="LiveId" clId="{37F4E37D-70FD-4C21-B8A2-BCB10CBCA044}" dt="2021-03-07T21:56:21.115" v="804" actId="14100"/>
       <pc:docMkLst>
         <pc:docMk/>
       </pc:docMkLst>
       <pc:sldChg chg="addSp delSp modSp mod">
-        <pc:chgData name="Vince McKeown" userId="31f1b572cc8f689e" providerId="LiveId" clId="{37F4E37D-70FD-4C21-B8A2-BCB10CBCA044}" dt="2021-02-28T20:41:35.399" v="46" actId="14100"/>
+        <pc:chgData name="Vince McKeown" userId="31f1b572cc8f689e" providerId="LiveId" clId="{37F4E37D-70FD-4C21-B8A2-BCB10CBCA044}" dt="2021-03-07T21:40:39.888" v="308" actId="20577"/>
         <pc:sldMkLst>
           <pc:docMk/>
           <pc:sldMk cId="4214349629" sldId="256"/>
         </pc:sldMkLst>
         <pc:spChg chg="mod">
-          <ac:chgData name="Vince McKeown" userId="31f1b572cc8f689e" providerId="LiveId" clId="{37F4E37D-70FD-4C21-B8A2-BCB10CBCA044}" dt="2021-02-28T20:32:30.153" v="7" actId="20577"/>
+          <ac:chgData name="Vince McKeown" userId="31f1b572cc8f689e" providerId="LiveId" clId="{37F4E37D-70FD-4C21-B8A2-BCB10CBCA044}" dt="2021-03-07T21:40:39.888" v="308" actId="20577"/>
           <ac:spMkLst>
             <pc:docMk/>
             <pc:sldMk cId="4214349629" sldId="256"/>
@@ -155,8 +154,16 @@
             <ac:picMk id="4" creationId="{39B7D547-5AD8-4F6C-9AB6-BA9F088277EA}"/>
           </ac:picMkLst>
         </pc:picChg>
-        <pc:picChg chg="mod">
-          <ac:chgData name="Vince McKeown" userId="31f1b572cc8f689e" providerId="LiveId" clId="{37F4E37D-70FD-4C21-B8A2-BCB10CBCA044}" dt="2021-02-28T20:41:19.041" v="42" actId="14100"/>
+        <pc:picChg chg="add mod">
+          <ac:chgData name="Vince McKeown" userId="31f1b572cc8f689e" providerId="LiveId" clId="{37F4E37D-70FD-4C21-B8A2-BCB10CBCA044}" dt="2021-03-07T21:39:34.324" v="294" actId="1076"/>
+          <ac:picMkLst>
+            <pc:docMk/>
+            <pc:sldMk cId="4214349629" sldId="256"/>
+            <ac:picMk id="4" creationId="{F261D2E5-EDB5-4EBE-9C3E-929E4B20525E}"/>
+          </ac:picMkLst>
+        </pc:picChg>
+        <pc:picChg chg="del mod">
+          <ac:chgData name="Vince McKeown" userId="31f1b572cc8f689e" providerId="LiveId" clId="{37F4E37D-70FD-4C21-B8A2-BCB10CBCA044}" dt="2021-03-07T21:38:31.769" v="288" actId="478"/>
           <ac:picMkLst>
             <pc:docMk/>
             <pc:sldMk cId="4214349629" sldId="256"/>
@@ -172,7 +179,7 @@
           </ac:picMkLst>
         </pc:picChg>
         <pc:picChg chg="add mod">
-          <ac:chgData name="Vince McKeown" userId="31f1b572cc8f689e" providerId="LiveId" clId="{37F4E37D-70FD-4C21-B8A2-BCB10CBCA044}" dt="2021-02-28T20:41:35.399" v="46" actId="14100"/>
+          <ac:chgData name="Vince McKeown" userId="31f1b572cc8f689e" providerId="LiveId" clId="{37F4E37D-70FD-4C21-B8A2-BCB10CBCA044}" dt="2021-03-07T21:39:44.274" v="296" actId="14100"/>
           <ac:picMkLst>
             <pc:docMk/>
             <pc:sldMk cId="4214349629" sldId="256"/>
@@ -181,17 +188,25 @@
         </pc:picChg>
       </pc:sldChg>
       <pc:sldChg chg="addSp delSp modSp mod">
-        <pc:chgData name="Vince McKeown" userId="31f1b572cc8f689e" providerId="LiveId" clId="{37F4E37D-70FD-4C21-B8A2-BCB10CBCA044}" dt="2021-02-28T20:40:45.417" v="37" actId="27614"/>
+        <pc:chgData name="Vince McKeown" userId="31f1b572cc8f689e" providerId="LiveId" clId="{37F4E37D-70FD-4C21-B8A2-BCB10CBCA044}" dt="2021-03-07T21:49:10.073" v="506" actId="1076"/>
         <pc:sldMkLst>
           <pc:docMk/>
           <pc:sldMk cId="2848627276" sldId="259"/>
         </pc:sldMkLst>
         <pc:spChg chg="mod">
-          <ac:chgData name="Vince McKeown" userId="31f1b572cc8f689e" providerId="LiveId" clId="{37F4E37D-70FD-4C21-B8A2-BCB10CBCA044}" dt="2021-02-28T20:40:11.286" v="30" actId="26606"/>
+          <ac:chgData name="Vince McKeown" userId="31f1b572cc8f689e" providerId="LiveId" clId="{37F4E37D-70FD-4C21-B8A2-BCB10CBCA044}" dt="2021-03-07T21:41:31.722" v="311" actId="1076"/>
           <ac:spMkLst>
             <pc:docMk/>
             <pc:sldMk cId="2848627276" sldId="259"/>
             <ac:spMk id="2" creationId="{00000000-0000-0000-0000-000000000000}"/>
+          </ac:spMkLst>
+        </pc:spChg>
+        <pc:spChg chg="add mod">
+          <ac:chgData name="Vince McKeown" userId="31f1b572cc8f689e" providerId="LiveId" clId="{37F4E37D-70FD-4C21-B8A2-BCB10CBCA044}" dt="2021-03-07T21:43:03.311" v="457" actId="20577"/>
+          <ac:spMkLst>
+            <pc:docMk/>
+            <pc:sldMk cId="2848627276" sldId="259"/>
+            <ac:spMk id="3" creationId="{56082198-C76B-48E5-9962-0B8F3B25425C}"/>
           </ac:spMkLst>
         </pc:spChg>
         <pc:spChg chg="add del mod">
@@ -410,12 +425,28 @@
             <ac:grpSpMk id="170" creationId="{FBF9A995-2C32-4FB7-B5F3-E417B7DE06E1}"/>
           </ac:grpSpMkLst>
         </pc:grpChg>
-        <pc:picChg chg="add mod ord">
-          <ac:chgData name="Vince McKeown" userId="31f1b572cc8f689e" providerId="LiveId" clId="{37F4E37D-70FD-4C21-B8A2-BCB10CBCA044}" dt="2021-02-28T20:40:28.611" v="36" actId="26606"/>
+        <pc:picChg chg="add mod modCrop">
+          <ac:chgData name="Vince McKeown" userId="31f1b572cc8f689e" providerId="LiveId" clId="{37F4E37D-70FD-4C21-B8A2-BCB10CBCA044}" dt="2021-03-07T21:47:17.976" v="502" actId="14100"/>
+          <ac:picMkLst>
+            <pc:docMk/>
+            <pc:sldMk cId="2848627276" sldId="259"/>
+            <ac:picMk id="7" creationId="{96EF4923-AF63-4D29-8066-59C336D6C8D9}"/>
+          </ac:picMkLst>
+        </pc:picChg>
+        <pc:picChg chg="add del mod ord">
+          <ac:chgData name="Vince McKeown" userId="31f1b572cc8f689e" providerId="LiveId" clId="{37F4E37D-70FD-4C21-B8A2-BCB10CBCA044}" dt="2021-03-07T21:41:25.097" v="309" actId="478"/>
           <ac:picMkLst>
             <pc:docMk/>
             <pc:sldMk cId="2848627276" sldId="259"/>
             <ac:picMk id="9" creationId="{18D417B6-60E3-4984-82A0-349F83A7B734}"/>
+          </ac:picMkLst>
+        </pc:picChg>
+        <pc:picChg chg="add mod">
+          <ac:chgData name="Vince McKeown" userId="31f1b572cc8f689e" providerId="LiveId" clId="{37F4E37D-70FD-4C21-B8A2-BCB10CBCA044}" dt="2021-03-07T21:49:10.073" v="506" actId="1076"/>
+          <ac:picMkLst>
+            <pc:docMk/>
+            <pc:sldMk cId="2848627276" sldId="259"/>
+            <ac:picMk id="10" creationId="{3D82962F-0F38-4131-8BAD-15E8431FEB81}"/>
           </ac:picMkLst>
         </pc:picChg>
         <pc:picChg chg="del">
@@ -426,8 +457,8 @@
             <ac:picMk id="11" creationId="{CADA6EAA-DA62-4E1C-8641-DC0CC7EA37B1}"/>
           </ac:picMkLst>
         </pc:picChg>
-        <pc:picChg chg="add mod ord">
-          <ac:chgData name="Vince McKeown" userId="31f1b572cc8f689e" providerId="LiveId" clId="{37F4E37D-70FD-4C21-B8A2-BCB10CBCA044}" dt="2021-02-28T20:40:45.417" v="37" actId="27614"/>
+        <pc:picChg chg="add del mod ord">
+          <ac:chgData name="Vince McKeown" userId="31f1b572cc8f689e" providerId="LiveId" clId="{37F4E37D-70FD-4C21-B8A2-BCB10CBCA044}" dt="2021-03-07T21:41:26.610" v="310" actId="478"/>
           <ac:picMkLst>
             <pc:docMk/>
             <pc:sldMk cId="2848627276" sldId="259"/>
@@ -452,7 +483,7 @@
         </pc:picChg>
       </pc:sldChg>
       <pc:sldChg chg="addSp delSp modSp mod">
-        <pc:chgData name="Vince McKeown" userId="31f1b572cc8f689e" providerId="LiveId" clId="{37F4E37D-70FD-4C21-B8A2-BCB10CBCA044}" dt="2021-02-28T20:47:31.599" v="195" actId="20577"/>
+        <pc:chgData name="Vince McKeown" userId="31f1b572cc8f689e" providerId="LiveId" clId="{37F4E37D-70FD-4C21-B8A2-BCB10CBCA044}" dt="2021-03-07T21:55:35.556" v="767" actId="20577"/>
         <pc:sldMkLst>
           <pc:docMk/>
           <pc:sldMk cId="178650098" sldId="260"/>
@@ -466,7 +497,7 @@
           </ac:spMkLst>
         </pc:spChg>
         <pc:spChg chg="mod">
-          <ac:chgData name="Vince McKeown" userId="31f1b572cc8f689e" providerId="LiveId" clId="{37F4E37D-70FD-4C21-B8A2-BCB10CBCA044}" dt="2021-02-28T20:47:31.599" v="195" actId="20577"/>
+          <ac:chgData name="Vince McKeown" userId="31f1b572cc8f689e" providerId="LiveId" clId="{37F4E37D-70FD-4C21-B8A2-BCB10CBCA044}" dt="2021-03-07T21:55:35.556" v="767" actId="20577"/>
           <ac:spMkLst>
             <pc:docMk/>
             <pc:sldMk cId="178650098" sldId="260"/>
@@ -553,6 +584,14 @@
             <ac:grpSpMk id="61" creationId="{6F1CEC7A-E419-4950-AA57-B00546C29CAF}"/>
           </ac:grpSpMkLst>
         </pc:grpChg>
+        <pc:picChg chg="add mod modCrop">
+          <ac:chgData name="Vince McKeown" userId="31f1b572cc8f689e" providerId="LiveId" clId="{37F4E37D-70FD-4C21-B8A2-BCB10CBCA044}" dt="2021-03-07T21:54:32.103" v="727" actId="1076"/>
+          <ac:picMkLst>
+            <pc:docMk/>
+            <pc:sldMk cId="178650098" sldId="260"/>
+            <ac:picMk id="5" creationId="{C27BBDE8-5135-48F1-A471-1439EA859A97}"/>
+          </ac:picMkLst>
+        </pc:picChg>
         <pc:picChg chg="del">
           <ac:chgData name="Vince McKeown" userId="31f1b572cc8f689e" providerId="LiveId" clId="{37F4E37D-70FD-4C21-B8A2-BCB10CBCA044}" dt="2021-02-28T20:45:51.303" v="169" actId="478"/>
           <ac:picMkLst>
@@ -563,19 +602,27 @@
         </pc:picChg>
       </pc:sldChg>
       <pc:sldChg chg="addSp delSp modSp mod">
-        <pc:chgData name="Vince McKeown" userId="31f1b572cc8f689e" providerId="LiveId" clId="{37F4E37D-70FD-4C21-B8A2-BCB10CBCA044}" dt="2021-02-28T20:48:51.505" v="234" actId="1076"/>
+        <pc:chgData name="Vince McKeown" userId="31f1b572cc8f689e" providerId="LiveId" clId="{37F4E37D-70FD-4C21-B8A2-BCB10CBCA044}" dt="2021-03-07T21:56:21.115" v="804" actId="14100"/>
         <pc:sldMkLst>
           <pc:docMk/>
           <pc:sldMk cId="2655501144" sldId="261"/>
         </pc:sldMkLst>
         <pc:spChg chg="add mod">
-          <ac:chgData name="Vince McKeown" userId="31f1b572cc8f689e" providerId="LiveId" clId="{37F4E37D-70FD-4C21-B8A2-BCB10CBCA044}" dt="2021-02-28T20:48:08.423" v="231" actId="20577"/>
+          <ac:chgData name="Vince McKeown" userId="31f1b572cc8f689e" providerId="LiveId" clId="{37F4E37D-70FD-4C21-B8A2-BCB10CBCA044}" dt="2021-03-07T21:56:21.115" v="804" actId="14100"/>
           <ac:spMkLst>
             <pc:docMk/>
             <pc:sldMk cId="2655501144" sldId="261"/>
             <ac:spMk id="7" creationId="{AB008655-A089-47F2-A4C6-EAFC52B8C2CB}"/>
           </ac:spMkLst>
         </pc:spChg>
+        <pc:picChg chg="add mod modCrop">
+          <ac:chgData name="Vince McKeown" userId="31f1b572cc8f689e" providerId="LiveId" clId="{37F4E37D-70FD-4C21-B8A2-BCB10CBCA044}" dt="2021-03-07T21:46:25.306" v="499" actId="14100"/>
+          <ac:picMkLst>
+            <pc:docMk/>
+            <pc:sldMk cId="2655501144" sldId="261"/>
+            <ac:picMk id="5" creationId="{B9028FB3-6E7D-448E-A40F-2FB5589EB1BB}"/>
+          </ac:picMkLst>
+        </pc:picChg>
         <pc:picChg chg="del">
           <ac:chgData name="Vince McKeown" userId="31f1b572cc8f689e" providerId="LiveId" clId="{37F4E37D-70FD-4C21-B8A2-BCB10CBCA044}" dt="2021-02-28T20:47:21.263" v="171" actId="478"/>
           <ac:picMkLst>
@@ -584,8 +631,8 @@
             <ac:picMk id="5" creationId="{DC0503B6-EFAD-4466-B7D7-D9D6A9AF8A1D}"/>
           </ac:picMkLst>
         </pc:picChg>
-        <pc:picChg chg="add mod">
-          <ac:chgData name="Vince McKeown" userId="31f1b572cc8f689e" providerId="LiveId" clId="{37F4E37D-70FD-4C21-B8A2-BCB10CBCA044}" dt="2021-02-28T20:48:51.505" v="234" actId="1076"/>
+        <pc:picChg chg="add del mod">
+          <ac:chgData name="Vince McKeown" userId="31f1b572cc8f689e" providerId="LiveId" clId="{37F4E37D-70FD-4C21-B8A2-BCB10CBCA044}" dt="2021-03-07T21:44:39.908" v="462" actId="478"/>
           <ac:picMkLst>
             <pc:docMk/>
             <pc:sldMk cId="2655501144" sldId="261"/>
@@ -609,8 +656,8 @@
           </ac:picMkLst>
         </pc:picChg>
       </pc:sldChg>
-      <pc:sldChg chg="addSp delSp modSp add mod">
-        <pc:chgData name="Vince McKeown" userId="31f1b572cc8f689e" providerId="LiveId" clId="{37F4E37D-70FD-4C21-B8A2-BCB10CBCA044}" dt="2021-02-28T20:51:08.029" v="287" actId="20577"/>
+      <pc:sldChg chg="addSp delSp modSp add del mod">
+        <pc:chgData name="Vince McKeown" userId="31f1b572cc8f689e" providerId="LiveId" clId="{37F4E37D-70FD-4C21-B8A2-BCB10CBCA044}" dt="2021-03-07T21:50:12.357" v="507" actId="47"/>
         <pc:sldMkLst>
           <pc:docMk/>
           <pc:sldMk cId="3123495901" sldId="262"/>
@@ -865,7 +912,7 @@
           <a:p>
             <a:fld id="{4710969A-8FFC-4E3F-8A8A-4D4AF92BD055}" type="datetimeFigureOut">
               <a:rPr lang="en-US" smtClean="0"/>
-              <a:t>2/27/2021</a:t>
+              <a:t>3/7/2021</a:t>
             </a:fld>
             <a:endParaRPr lang="en-US"/>
           </a:p>
@@ -1203,7 +1250,7 @@
           <a:p>
             <a:fld id="{4710969A-8FFC-4E3F-8A8A-4D4AF92BD055}" type="datetimeFigureOut">
               <a:rPr lang="en-US" smtClean="0"/>
-              <a:t>2/27/2021</a:t>
+              <a:t>3/7/2021</a:t>
             </a:fld>
             <a:endParaRPr lang="en-US"/>
           </a:p>
@@ -1604,7 +1651,7 @@
           <a:p>
             <a:fld id="{4710969A-8FFC-4E3F-8A8A-4D4AF92BD055}" type="datetimeFigureOut">
               <a:rPr lang="en-US" smtClean="0"/>
-              <a:t>2/27/2021</a:t>
+              <a:t>3/7/2021</a:t>
             </a:fld>
             <a:endParaRPr lang="en-US"/>
           </a:p>
@@ -1940,7 +1987,7 @@
           <a:p>
             <a:fld id="{4710969A-8FFC-4E3F-8A8A-4D4AF92BD055}" type="datetimeFigureOut">
               <a:rPr lang="en-US" smtClean="0"/>
-              <a:t>2/27/2021</a:t>
+              <a:t>3/7/2021</a:t>
             </a:fld>
             <a:endParaRPr lang="en-US"/>
           </a:p>
@@ -2260,7 +2307,7 @@
           <a:p>
             <a:fld id="{4710969A-8FFC-4E3F-8A8A-4D4AF92BD055}" type="datetimeFigureOut">
               <a:rPr lang="en-US" smtClean="0"/>
-              <a:t>2/27/2021</a:t>
+              <a:t>3/7/2021</a:t>
             </a:fld>
             <a:endParaRPr lang="en-US"/>
           </a:p>
@@ -2656,7 +2703,7 @@
           <a:p>
             <a:fld id="{4710969A-8FFC-4E3F-8A8A-4D4AF92BD055}" type="datetimeFigureOut">
               <a:rPr lang="en-US" smtClean="0"/>
-              <a:t>2/27/2021</a:t>
+              <a:t>3/7/2021</a:t>
             </a:fld>
             <a:endParaRPr lang="en-US"/>
           </a:p>
@@ -2913,7 +2960,7 @@
           <a:p>
             <a:fld id="{4710969A-8FFC-4E3F-8A8A-4D4AF92BD055}" type="datetimeFigureOut">
               <a:rPr lang="en-US" smtClean="0"/>
-              <a:t>2/27/2021</a:t>
+              <a:t>3/7/2021</a:t>
             </a:fld>
             <a:endParaRPr lang="en-US"/>
           </a:p>
@@ -3175,7 +3222,7 @@
           <a:p>
             <a:fld id="{4710969A-8FFC-4E3F-8A8A-4D4AF92BD055}" type="datetimeFigureOut">
               <a:rPr lang="en-US" smtClean="0"/>
-              <a:t>2/27/2021</a:t>
+              <a:t>3/7/2021</a:t>
             </a:fld>
             <a:endParaRPr lang="en-US"/>
           </a:p>
@@ -3437,7 +3484,7 @@
           <a:p>
             <a:fld id="{4710969A-8FFC-4E3F-8A8A-4D4AF92BD055}" type="datetimeFigureOut">
               <a:rPr lang="en-US" smtClean="0"/>
-              <a:t>2/27/2021</a:t>
+              <a:t>3/7/2021</a:t>
             </a:fld>
             <a:endParaRPr lang="en-US"/>
           </a:p>
@@ -3766,7 +3813,7 @@
           <a:p>
             <a:fld id="{4710969A-8FFC-4E3F-8A8A-4D4AF92BD055}" type="datetimeFigureOut">
               <a:rPr lang="en-US" smtClean="0"/>
-              <a:t>2/27/2021</a:t>
+              <a:t>3/7/2021</a:t>
             </a:fld>
             <a:endParaRPr lang="en-US"/>
           </a:p>
@@ -4089,7 +4136,7 @@
           <a:p>
             <a:fld id="{4710969A-8FFC-4E3F-8A8A-4D4AF92BD055}" type="datetimeFigureOut">
               <a:rPr lang="en-US" smtClean="0"/>
-              <a:t>2/27/2021</a:t>
+              <a:t>3/7/2021</a:t>
             </a:fld>
             <a:endParaRPr lang="en-US"/>
           </a:p>
@@ -4546,7 +4593,7 @@
           <a:p>
             <a:fld id="{4710969A-8FFC-4E3F-8A8A-4D4AF92BD055}" type="datetimeFigureOut">
               <a:rPr lang="en-US" smtClean="0"/>
-              <a:t>2/27/2021</a:t>
+              <a:t>3/7/2021</a:t>
             </a:fld>
             <a:endParaRPr lang="en-US"/>
           </a:p>
@@ -4751,7 +4798,7 @@
           <a:p>
             <a:fld id="{4710969A-8FFC-4E3F-8A8A-4D4AF92BD055}" type="datetimeFigureOut">
               <a:rPr lang="en-US" smtClean="0"/>
-              <a:t>2/27/2021</a:t>
+              <a:t>3/7/2021</a:t>
             </a:fld>
             <a:endParaRPr lang="en-US"/>
           </a:p>
@@ -4928,7 +4975,7 @@
           <a:p>
             <a:fld id="{4710969A-8FFC-4E3F-8A8A-4D4AF92BD055}" type="datetimeFigureOut">
               <a:rPr lang="en-US" smtClean="0"/>
-              <a:t>2/27/2021</a:t>
+              <a:t>3/7/2021</a:t>
             </a:fld>
             <a:endParaRPr lang="en-US"/>
           </a:p>
@@ -5261,7 +5308,7 @@
           <a:p>
             <a:fld id="{4710969A-8FFC-4E3F-8A8A-4D4AF92BD055}" type="datetimeFigureOut">
               <a:rPr lang="en-US" smtClean="0"/>
-              <a:t>2/27/2021</a:t>
+              <a:t>3/7/2021</a:t>
             </a:fld>
             <a:endParaRPr lang="en-US"/>
           </a:p>
@@ -5606,7 +5653,7 @@
           <a:p>
             <a:fld id="{4710969A-8FFC-4E3F-8A8A-4D4AF92BD055}" type="datetimeFigureOut">
               <a:rPr lang="en-US" smtClean="0"/>
-              <a:t>2/27/2021</a:t>
+              <a:t>3/7/2021</a:t>
             </a:fld>
             <a:endParaRPr lang="en-US"/>
           </a:p>
@@ -7723,7 +7770,7 @@
           <a:p>
             <a:fld id="{4710969A-8FFC-4E3F-8A8A-4D4AF92BD055}" type="datetimeFigureOut">
               <a:rPr lang="en-US" smtClean="0"/>
-              <a:t>2/27/2021</a:t>
+              <a:t>3/7/2021</a:t>
             </a:fld>
             <a:endParaRPr lang="en-US"/>
           </a:p>
@@ -8294,7 +8341,7 @@
                   </a:schemeClr>
                 </a:solidFill>
               </a:rPr>
-              <a:t>Pitch Date:  1/31/2021						Today:  2/28/2021	3:40 PM EST</a:t>
+              <a:t>Pitch Date:  1/31/2021						Today:  3/7/2021	4:00 PM EST</a:t>
             </a:r>
           </a:p>
           <a:p>
@@ -8318,7 +8365,7 @@
                   </a:schemeClr>
                 </a:solidFill>
               </a:rPr>
-              <a:t>Team Lead:  Vince McKeown				179 Commits total, 39 Week 4</a:t>
+              <a:t>Team Lead:  Vince McKeown				242 Commits total, 62 Week 5</a:t>
             </a:r>
           </a:p>
         </p:txBody>
@@ -8358,7 +8405,7 @@
           </a:bodyPr>
           <a:lstStyle/>
           <a:p>
-            <a:endParaRPr lang="en-US"/>
+            <a:endParaRPr lang="en-US" dirty="0"/>
           </a:p>
         </p:txBody>
       </p:sp>
@@ -8397,7 +8444,7 @@
           </a:bodyPr>
           <a:lstStyle/>
           <a:p>
-            <a:endParaRPr lang="en-US"/>
+            <a:endParaRPr lang="en-US" dirty="0"/>
           </a:p>
         </p:txBody>
       </p:sp>
@@ -8449,10 +8496,10 @@
       </p:cxnSp>
       <p:pic>
         <p:nvPicPr>
-          <p:cNvPr id="1026" name="Picture 2">
+          <p:cNvPr id="2050" name="Picture 2">
             <a:extLst>
               <a:ext uri="{FF2B5EF4-FFF2-40B4-BE49-F238E27FC236}">
-                <a16:creationId xmlns:a16="http://schemas.microsoft.com/office/drawing/2014/main" id="{F21202B4-B7F9-4CCA-92D5-FF326A9DB9F5}"/>
+                <a16:creationId xmlns:a16="http://schemas.microsoft.com/office/drawing/2014/main" id="{8F9BC333-EBE7-48BE-BBFF-DC8C29FB3032}"/>
               </a:ext>
             </a:extLst>
           </p:cNvPr>
@@ -8476,8 +8523,8 @@
         </p:blipFill>
         <p:spPr bwMode="auto">
           <a:xfrm>
-            <a:off x="989505" y="402212"/>
-            <a:ext cx="4325036" cy="3243777"/>
+            <a:off x="852240" y="208618"/>
+            <a:ext cx="4604868" cy="3453651"/>
           </a:xfrm>
           <a:prstGeom prst="rect">
             <a:avLst/>
@@ -8496,10 +8543,10 @@
       </p:pic>
       <p:pic>
         <p:nvPicPr>
-          <p:cNvPr id="2050" name="Picture 2">
+          <p:cNvPr id="4" name="Picture 2">
             <a:extLst>
               <a:ext uri="{FF2B5EF4-FFF2-40B4-BE49-F238E27FC236}">
-                <a16:creationId xmlns:a16="http://schemas.microsoft.com/office/drawing/2014/main" id="{8F9BC333-EBE7-48BE-BBFF-DC8C29FB3032}"/>
+                <a16:creationId xmlns:a16="http://schemas.microsoft.com/office/drawing/2014/main" id="{F261D2E5-EDB5-4EBE-9C3E-929E4B20525E}"/>
               </a:ext>
             </a:extLst>
           </p:cNvPr>
@@ -8523,8 +8570,8 @@
         </p:blipFill>
         <p:spPr bwMode="auto">
           <a:xfrm>
-            <a:off x="7406415" y="402208"/>
-            <a:ext cx="4325036" cy="3243777"/>
+            <a:off x="7286376" y="187668"/>
+            <a:ext cx="4632821" cy="3474616"/>
           </a:xfrm>
           <a:prstGeom prst="rect">
             <a:avLst/>
@@ -10980,7 +11027,7 @@
           <a:lstStyle/>
           <a:p>
             <a:pPr algn="ctr"/>
-            <a:endParaRPr lang="en-US"/>
+            <a:endParaRPr lang="en-US" dirty="0"/>
           </a:p>
         </p:txBody>
       </p:sp>
@@ -12065,7 +12112,7 @@
         </p:nvSpPr>
         <p:spPr>
           <a:xfrm>
-            <a:off x="2589213" y="4529540"/>
+            <a:off x="2383899" y="248519"/>
             <a:ext cx="8915399" cy="1162423"/>
           </a:xfrm>
         </p:spPr>
@@ -12081,14 +12128,14 @@
               </a:lnSpc>
             </a:pPr>
             <a:r>
-              <a:rPr lang="en-US" sz="3800"/>
+              <a:rPr lang="en-US" sz="3800" dirty="0"/>
               <a:t>Contributors this week:</a:t>
             </a:r>
             <a:br>
-              <a:rPr lang="en-US" sz="3800"/>
+              <a:rPr lang="en-US" sz="3800" dirty="0"/>
             </a:br>
             <a:r>
-              <a:rPr lang="en-US" sz="3800"/>
+              <a:rPr lang="en-US" sz="3800" dirty="0"/>
               <a:t>Kyle Knutson</a:t>
             </a:r>
           </a:p>
@@ -13253,66 +13300,6 @@
           </a:fontRef>
         </p:style>
       </p:sp>
-      <p:pic>
-        <p:nvPicPr>
-          <p:cNvPr id="9" name="Picture 8">
-            <a:extLst>
-              <a:ext uri="{FF2B5EF4-FFF2-40B4-BE49-F238E27FC236}">
-                <a16:creationId xmlns:a16="http://schemas.microsoft.com/office/drawing/2014/main" id="{18D417B6-60E3-4984-82A0-349F83A7B734}"/>
-              </a:ext>
-            </a:extLst>
-          </p:cNvPr>
-          <p:cNvPicPr>
-            <a:picLocks noChangeAspect="1"/>
-          </p:cNvPicPr>
-          <p:nvPr/>
-        </p:nvPicPr>
-        <p:blipFill>
-          <a:blip r:embed="rId2"/>
-          <a:stretch>
-            <a:fillRect/>
-          </a:stretch>
-        </p:blipFill>
-        <p:spPr>
-          <a:xfrm>
-            <a:off x="2987589" y="640080"/>
-            <a:ext cx="3602736" cy="3602736"/>
-          </a:xfrm>
-          <a:prstGeom prst="rect">
-            <a:avLst/>
-          </a:prstGeom>
-        </p:spPr>
-      </p:pic>
-      <p:pic>
-        <p:nvPicPr>
-          <p:cNvPr id="12" name="Picture 11" descr="Diagram&#10;&#10;Description automatically generated">
-            <a:extLst>
-              <a:ext uri="{FF2B5EF4-FFF2-40B4-BE49-F238E27FC236}">
-                <a16:creationId xmlns:a16="http://schemas.microsoft.com/office/drawing/2014/main" id="{9E2D58A7-E8A6-4FE4-9CF6-3892D4D9F20A}"/>
-              </a:ext>
-            </a:extLst>
-          </p:cNvPr>
-          <p:cNvPicPr>
-            <a:picLocks noChangeAspect="1"/>
-          </p:cNvPicPr>
-          <p:nvPr/>
-        </p:nvPicPr>
-        <p:blipFill>
-          <a:blip r:embed="rId3"/>
-          <a:stretch>
-            <a:fillRect/>
-          </a:stretch>
-        </p:blipFill>
-        <p:spPr>
-          <a:xfrm>
-            <a:off x="7152428" y="901626"/>
-            <a:ext cx="4399491" cy="3079643"/>
-          </a:xfrm>
-          <a:prstGeom prst="rect">
-            <a:avLst/>
-          </a:prstGeom>
-        </p:spPr>
-      </p:pic>
       <p:sp>
         <p:nvSpPr>
           <p:cNvPr id="186" name="Freeform 33">
@@ -13453,7 +13440,7 @@
           </a:bodyPr>
           <a:lstStyle/>
           <a:p>
-            <a:endParaRPr lang="en-US"/>
+            <a:endParaRPr lang="en-US" dirty="0"/>
           </a:p>
         </p:txBody>
       </p:sp>
@@ -13498,10 +13485,128 @@
           </a:bodyPr>
           <a:lstStyle/>
           <a:p>
-            <a:endParaRPr lang="en-US"/>
+            <a:endParaRPr lang="en-US" dirty="0"/>
           </a:p>
         </p:txBody>
       </p:sp>
+      <p:sp>
+        <p:nvSpPr>
+          <p:cNvPr id="3" name="TextBox 2">
+            <a:extLst>
+              <a:ext uri="{FF2B5EF4-FFF2-40B4-BE49-F238E27FC236}">
+                <a16:creationId xmlns:a16="http://schemas.microsoft.com/office/drawing/2014/main" id="{56082198-C76B-48E5-9962-0B8F3B25425C}"/>
+              </a:ext>
+            </a:extLst>
+          </p:cNvPr>
+          <p:cNvSpPr txBox="1"/>
+          <p:nvPr/>
+        </p:nvSpPr>
+        <p:spPr>
+          <a:xfrm>
+            <a:off x="2535382" y="1939636"/>
+            <a:ext cx="8650319" cy="369332"/>
+          </a:xfrm>
+          <a:prstGeom prst="rect">
+            <a:avLst/>
+          </a:prstGeom>
+          <a:noFill/>
+        </p:spPr>
+        <p:txBody>
+          <a:bodyPr wrap="square" rtlCol="0">
+            <a:spAutoFit/>
+          </a:bodyPr>
+          <a:lstStyle/>
+          <a:p>
+            <a:pPr marL="285750" indent="-285750">
+              <a:buFont typeface="Arial" panose="020B0604020202020204" pitchFamily="34" charset="0"/>
+              <a:buChar char="•"/>
+            </a:pPr>
+            <a:r>
+              <a:rPr lang="en-US" dirty="0"/>
+              <a:t>Updates to </a:t>
+            </a:r>
+            <a:r>
+              <a:rPr lang="en-US" dirty="0" err="1"/>
+              <a:t>WorldGen</a:t>
+            </a:r>
+            <a:r>
+              <a:rPr lang="en-US" dirty="0"/>
+              <a:t>, Title Screen, buttons</a:t>
+            </a:r>
+          </a:p>
+        </p:txBody>
+      </p:sp>
+      <p:pic>
+        <p:nvPicPr>
+          <p:cNvPr id="7" name="Picture 6" descr="A picture containing text, indoor, scoreboard, different&#10;&#10;Description automatically generated">
+            <a:extLst>
+              <a:ext uri="{FF2B5EF4-FFF2-40B4-BE49-F238E27FC236}">
+                <a16:creationId xmlns:a16="http://schemas.microsoft.com/office/drawing/2014/main" id="{96EF4923-AF63-4D29-8066-59C336D6C8D9}"/>
+              </a:ext>
+            </a:extLst>
+          </p:cNvPr>
+          <p:cNvPicPr>
+            <a:picLocks noChangeAspect="1"/>
+          </p:cNvPicPr>
+          <p:nvPr/>
+        </p:nvPicPr>
+        <p:blipFill rotWithShape="1">
+          <a:blip r:embed="rId2">
+            <a:extLst>
+              <a:ext uri="{28A0092B-C50C-407E-A947-70E740481C1C}">
+                <a14:useLocalDpi xmlns:a14="http://schemas.microsoft.com/office/drawing/2010/main" val="0"/>
+              </a:ext>
+            </a:extLst>
+          </a:blip>
+          <a:srcRect t="60956"/>
+          <a:stretch/>
+        </p:blipFill>
+        <p:spPr>
+          <a:xfrm>
+            <a:off x="2992582" y="3145800"/>
+            <a:ext cx="7046800" cy="2751371"/>
+          </a:xfrm>
+          <a:prstGeom prst="rect">
+            <a:avLst/>
+          </a:prstGeom>
+        </p:spPr>
+      </p:pic>
+      <p:pic>
+        <p:nvPicPr>
+          <p:cNvPr id="10" name="Picture 9">
+            <a:extLst>
+              <a:ext uri="{FF2B5EF4-FFF2-40B4-BE49-F238E27FC236}">
+                <a16:creationId xmlns:a16="http://schemas.microsoft.com/office/drawing/2014/main" id="{3D82962F-0F38-4131-8BAD-15E8431FEB81}"/>
+              </a:ext>
+            </a:extLst>
+          </p:cNvPr>
+          <p:cNvPicPr>
+            <a:picLocks noChangeAspect="1"/>
+          </p:cNvPicPr>
+          <p:nvPr/>
+        </p:nvPicPr>
+        <p:blipFill>
+          <a:blip r:embed="rId3">
+            <a:extLst>
+              <a:ext uri="{28A0092B-C50C-407E-A947-70E740481C1C}">
+                <a14:useLocalDpi xmlns:a14="http://schemas.microsoft.com/office/drawing/2010/main" val="0"/>
+              </a:ext>
+            </a:extLst>
+          </a:blip>
+          <a:stretch>
+            <a:fillRect/>
+          </a:stretch>
+        </p:blipFill>
+        <p:spPr>
+          <a:xfrm>
+            <a:off x="10425700" y="2888150"/>
+            <a:ext cx="1520001" cy="3040001"/>
+          </a:xfrm>
+          <a:prstGeom prst="rect">
+            <a:avLst/>
+          </a:prstGeom>
+        </p:spPr>
+      </p:pic>
     </p:spTree>
     <p:extLst>
       <p:ext uri="{BB962C8B-B14F-4D97-AF65-F5344CB8AC3E}">
@@ -13648,7 +13753,7 @@
               <a:rPr lang="en-US" dirty="0"/>
             </a:br>
             <a:r>
-              <a:rPr lang="en-US"/>
+              <a:rPr lang="en-US" dirty="0"/>
               <a:t>Tylor Allison</a:t>
             </a:r>
           </a:p>
@@ -16042,38 +16147,71 @@
         </p:spPr>
         <p:txBody>
           <a:bodyPr>
-            <a:normAutofit/>
+            <a:normAutofit lnSpcReduction="10000"/>
           </a:bodyPr>
           <a:lstStyle/>
           <a:p>
             <a:r>
               <a:rPr lang="en-US" dirty="0"/>
-              <a:t>Layering for Draw Code</a:t>
+              <a:t>NPC Dialogue / Interactions</a:t>
             </a:r>
           </a:p>
           <a:p>
             <a:r>
               <a:rPr lang="en-US" dirty="0"/>
-              <a:t>Ranged Attacks</a:t>
+              <a:t>Text support wrapping</a:t>
             </a:r>
           </a:p>
           <a:p>
             <a:r>
               <a:rPr lang="en-US" dirty="0"/>
-              <a:t>Melee Animations</a:t>
+              <a:t>Breakable objects</a:t>
             </a:r>
           </a:p>
           <a:p>
             <a:r>
               <a:rPr lang="en-US" dirty="0"/>
-              <a:t>Tile Editor</a:t>
+              <a:t>Inventory Screen</a:t>
             </a:r>
           </a:p>
           <a:p>
             <a:r>
               <a:rPr lang="en-US" dirty="0"/>
-              <a:t>Bug Fixes</a:t>
+              <a:t>Colliders</a:t>
             </a:r>
+          </a:p>
+          <a:p>
+            <a:r>
+              <a:rPr lang="en-US" dirty="0"/>
+              <a:t>Updates to Melee Attack</a:t>
+            </a:r>
+          </a:p>
+          <a:p>
+            <a:r>
+              <a:rPr lang="en-US" dirty="0"/>
+              <a:t>Bug fixes</a:t>
+            </a:r>
+          </a:p>
+          <a:p>
+            <a:r>
+              <a:rPr lang="en-US" dirty="0"/>
+              <a:t>Placeholder art</a:t>
+            </a:r>
+          </a:p>
+          <a:p>
+            <a:r>
+              <a:rPr lang="en-US" dirty="0"/>
+              <a:t>Updates to UI layout</a:t>
+            </a:r>
+          </a:p>
+          <a:p>
+            <a:r>
+              <a:rPr lang="en-US" dirty="0"/>
+              <a:t>Additional rooms</a:t>
+            </a:r>
+          </a:p>
+          <a:p>
+            <a:endParaRPr lang="en-US" dirty="0"/>
           </a:p>
           <a:p>
             <a:endParaRPr lang="en-US" dirty="0"/>
@@ -16086,6 +16224,41 @@
           </a:p>
         </p:txBody>
       </p:sp>
+      <p:pic>
+        <p:nvPicPr>
+          <p:cNvPr id="5" name="Picture 4">
+            <a:extLst>
+              <a:ext uri="{FF2B5EF4-FFF2-40B4-BE49-F238E27FC236}">
+                <a16:creationId xmlns:a16="http://schemas.microsoft.com/office/drawing/2014/main" id="{C27BBDE8-5135-48F1-A471-1439EA859A97}"/>
+              </a:ext>
+            </a:extLst>
+          </p:cNvPr>
+          <p:cNvPicPr>
+            <a:picLocks noChangeAspect="1"/>
+          </p:cNvPicPr>
+          <p:nvPr/>
+        </p:nvPicPr>
+        <p:blipFill rotWithShape="1">
+          <a:blip r:embed="rId2">
+            <a:extLst>
+              <a:ext uri="{28A0092B-C50C-407E-A947-70E740481C1C}">
+                <a14:useLocalDpi xmlns:a14="http://schemas.microsoft.com/office/drawing/2010/main" val="0"/>
+              </a:ext>
+            </a:extLst>
+          </a:blip>
+          <a:srcRect l="-2653" t="14519" r="57911" b="71834"/>
+          <a:stretch/>
+        </p:blipFill>
+        <p:spPr>
+          <a:xfrm>
+            <a:off x="7631769" y="4121244"/>
+            <a:ext cx="7420712" cy="2263367"/>
+          </a:xfrm>
+          <a:prstGeom prst="rect">
+            <a:avLst/>
+          </a:prstGeom>
+        </p:spPr>
+      </p:pic>
     </p:spTree>
     <p:extLst>
       <p:ext uri="{BB962C8B-B14F-4D97-AF65-F5344CB8AC3E}">
@@ -16196,7 +16369,7 @@
         <p:spPr>
           <a:xfrm>
             <a:off x="2589212" y="2133600"/>
-            <a:ext cx="8915400" cy="3777622"/>
+            <a:ext cx="7334277" cy="3777622"/>
           </a:xfrm>
           <a:prstGeom prst="rect">
             <a:avLst/>
@@ -16427,11 +16600,8 @@
           <a:p>
             <a:r>
               <a:rPr lang="en-US" dirty="0"/>
-              <a:t>Pathfinding Patches</a:t>
+              <a:t>Added Sounds for health, mana, and opening doors </a:t>
             </a:r>
-          </a:p>
-          <a:p>
-            <a:endParaRPr lang="en-US" dirty="0"/>
           </a:p>
           <a:p>
             <a:pPr marL="0" indent="0">
@@ -16444,10 +16614,10 @@
       </p:sp>
       <p:pic>
         <p:nvPicPr>
-          <p:cNvPr id="6" name="Picture 5">
+          <p:cNvPr id="5" name="Picture 4" descr="A picture containing text, indoor, scoreboard, different&#10;&#10;Description automatically generated">
             <a:extLst>
               <a:ext uri="{FF2B5EF4-FFF2-40B4-BE49-F238E27FC236}">
-                <a16:creationId xmlns:a16="http://schemas.microsoft.com/office/drawing/2014/main" id="{D4F070B9-C66D-4E51-AEE6-BBBDFCFF4F04}"/>
+                <a16:creationId xmlns:a16="http://schemas.microsoft.com/office/drawing/2014/main" id="{B9028FB3-6E7D-448E-A40F-2FB5589EB1BB}"/>
               </a:ext>
             </a:extLst>
           </p:cNvPr>
@@ -16456,16 +16626,21 @@
           </p:cNvPicPr>
           <p:nvPr/>
         </p:nvPicPr>
-        <p:blipFill>
-          <a:blip r:embed="rId2"/>
-          <a:stretch>
-            <a:fillRect/>
-          </a:stretch>
+        <p:blipFill rotWithShape="1">
+          <a:blip r:embed="rId2">
+            <a:extLst>
+              <a:ext uri="{28A0092B-C50C-407E-A947-70E740481C1C}">
+                <a14:useLocalDpi xmlns:a14="http://schemas.microsoft.com/office/drawing/2010/main" val="0"/>
+              </a:ext>
+            </a:extLst>
+          </a:blip>
+          <a:srcRect l="70548" t="60526" r="9399" b="28421"/>
+          <a:stretch/>
         </p:blipFill>
         <p:spPr>
           <a:xfrm>
-            <a:off x="2986547" y="3100695"/>
-            <a:ext cx="1477297" cy="2185168"/>
+            <a:off x="3283063" y="3428999"/>
+            <a:ext cx="2041084" cy="1172029"/>
           </a:xfrm>
           <a:prstGeom prst="rect">
             <a:avLst/>
@@ -16476,337 +16651,6 @@
     <p:extLst>
       <p:ext uri="{BB962C8B-B14F-4D97-AF65-F5344CB8AC3E}">
         <p14:creationId xmlns:p14="http://schemas.microsoft.com/office/powerpoint/2010/main" val="2655501144"/>
-      </p:ext>
-    </p:extLst>
-  </p:cSld>
-  <p:clrMapOvr>
-    <a:masterClrMapping/>
-  </p:clrMapOvr>
-</p:sld>
-</file>
-
-<file path=ppt/slides/slide5.xml><?xml version="1.0" encoding="utf-8"?>
-<p:sld xmlns:a="http://schemas.openxmlformats.org/drawingml/2006/main" xmlns:r="http://schemas.openxmlformats.org/officeDocument/2006/relationships" xmlns:p="http://schemas.openxmlformats.org/presentationml/2006/main">
-  <p:cSld>
-    <p:spTree>
-      <p:nvGrpSpPr>
-        <p:cNvPr id="1" name=""/>
-        <p:cNvGrpSpPr/>
-        <p:nvPr/>
-      </p:nvGrpSpPr>
-      <p:grpSpPr>
-        <a:xfrm>
-          <a:off x="0" y="0"/>
-          <a:ext cx="0" cy="0"/>
-          <a:chOff x="0" y="0"/>
-          <a:chExt cx="0" cy="0"/>
-        </a:xfrm>
-      </p:grpSpPr>
-      <p:sp>
-        <p:nvSpPr>
-          <p:cNvPr id="2" name="Title 1"/>
-          <p:cNvSpPr>
-            <a:spLocks noGrp="1"/>
-          </p:cNvSpPr>
-          <p:nvPr>
-            <p:ph type="title"/>
-          </p:nvPr>
-        </p:nvSpPr>
-        <p:spPr/>
-        <p:txBody>
-          <a:bodyPr/>
-          <a:lstStyle/>
-          <a:p>
-            <a:r>
-              <a:rPr lang="en-US" dirty="0"/>
-              <a:t>Contributors this week:</a:t>
-            </a:r>
-            <a:br>
-              <a:rPr lang="en-US" dirty="0"/>
-            </a:br>
-            <a:r>
-              <a:rPr lang="en-US" dirty="0" err="1">
-                <a:solidFill>
-                  <a:srgbClr val="FF0000"/>
-                </a:solidFill>
-              </a:rPr>
-              <a:t>Kulesko</a:t>
-            </a:r>
-            <a:endParaRPr lang="en-US" dirty="0">
-              <a:solidFill>
-                <a:srgbClr val="FF0000"/>
-              </a:solidFill>
-            </a:endParaRPr>
-          </a:p>
-        </p:txBody>
-      </p:sp>
-      <p:sp>
-        <p:nvSpPr>
-          <p:cNvPr id="9" name="Content Placeholder 2">
-            <a:extLst>
-              <a:ext uri="{FF2B5EF4-FFF2-40B4-BE49-F238E27FC236}">
-                <a16:creationId xmlns:a16="http://schemas.microsoft.com/office/drawing/2014/main" id="{B21A0F18-3A78-4EB4-8DA8-EFD3587E0C5D}"/>
-              </a:ext>
-            </a:extLst>
-          </p:cNvPr>
-          <p:cNvSpPr txBox="1">
-            <a:spLocks/>
-          </p:cNvSpPr>
-          <p:nvPr/>
-        </p:nvSpPr>
-        <p:spPr>
-          <a:xfrm>
-            <a:off x="2589212" y="2133600"/>
-            <a:ext cx="8915400" cy="3777622"/>
-          </a:xfrm>
-          <a:prstGeom prst="rect">
-            <a:avLst/>
-          </a:prstGeom>
-        </p:spPr>
-        <p:txBody>
-          <a:bodyPr vert="horz" lIns="91440" tIns="45720" rIns="91440" bIns="45720" rtlCol="0">
-            <a:normAutofit/>
-          </a:bodyPr>
-          <a:lstStyle>
-            <a:lvl1pPr marL="342900" indent="-342900" algn="l" defTabSz="457200" rtl="0" eaLnBrk="1" latinLnBrk="0" hangingPunct="1">
-              <a:spcBef>
-                <a:spcPts val="1000"/>
-              </a:spcBef>
-              <a:spcAft>
-                <a:spcPts val="0"/>
-              </a:spcAft>
-              <a:buClr>
-                <a:schemeClr val="accent1"/>
-              </a:buClr>
-              <a:buFont typeface="Wingdings 3" charset="2"/>
-              <a:buChar char=""/>
-              <a:defRPr sz="1800" kern="1200">
-                <a:solidFill>
-                  <a:schemeClr val="tx1">
-                    <a:lumMod val="75000"/>
-                    <a:lumOff val="25000"/>
-                  </a:schemeClr>
-                </a:solidFill>
-                <a:latin typeface="+mn-lt"/>
-                <a:ea typeface="+mn-ea"/>
-                <a:cs typeface="+mn-cs"/>
-              </a:defRPr>
-            </a:lvl1pPr>
-            <a:lvl2pPr marL="742950" indent="-285750" algn="l" defTabSz="457200" rtl="0" eaLnBrk="1" latinLnBrk="0" hangingPunct="1">
-              <a:spcBef>
-                <a:spcPts val="1000"/>
-              </a:spcBef>
-              <a:spcAft>
-                <a:spcPts val="0"/>
-              </a:spcAft>
-              <a:buClr>
-                <a:schemeClr val="accent1"/>
-              </a:buClr>
-              <a:buFont typeface="Wingdings 3" charset="2"/>
-              <a:buChar char=""/>
-              <a:defRPr sz="1600" kern="1200">
-                <a:solidFill>
-                  <a:schemeClr val="tx1">
-                    <a:lumMod val="75000"/>
-                    <a:lumOff val="25000"/>
-                  </a:schemeClr>
-                </a:solidFill>
-                <a:latin typeface="+mn-lt"/>
-                <a:ea typeface="+mn-ea"/>
-                <a:cs typeface="+mn-cs"/>
-              </a:defRPr>
-            </a:lvl2pPr>
-            <a:lvl3pPr marL="1143000" indent="-228600" algn="l" defTabSz="457200" rtl="0" eaLnBrk="1" latinLnBrk="0" hangingPunct="1">
-              <a:spcBef>
-                <a:spcPts val="1000"/>
-              </a:spcBef>
-              <a:spcAft>
-                <a:spcPts val="0"/>
-              </a:spcAft>
-              <a:buClr>
-                <a:schemeClr val="accent1"/>
-              </a:buClr>
-              <a:buFont typeface="Wingdings 3" charset="2"/>
-              <a:buChar char=""/>
-              <a:defRPr sz="1400" kern="1200">
-                <a:solidFill>
-                  <a:schemeClr val="tx1">
-                    <a:lumMod val="75000"/>
-                    <a:lumOff val="25000"/>
-                  </a:schemeClr>
-                </a:solidFill>
-                <a:latin typeface="+mn-lt"/>
-                <a:ea typeface="+mn-ea"/>
-                <a:cs typeface="+mn-cs"/>
-              </a:defRPr>
-            </a:lvl3pPr>
-            <a:lvl4pPr marL="1600200" indent="-228600" algn="l" defTabSz="457200" rtl="0" eaLnBrk="1" latinLnBrk="0" hangingPunct="1">
-              <a:spcBef>
-                <a:spcPts val="1000"/>
-              </a:spcBef>
-              <a:spcAft>
-                <a:spcPts val="0"/>
-              </a:spcAft>
-              <a:buClr>
-                <a:schemeClr val="accent1"/>
-              </a:buClr>
-              <a:buFont typeface="Wingdings 3" charset="2"/>
-              <a:buChar char=""/>
-              <a:defRPr sz="1200" kern="1200">
-                <a:solidFill>
-                  <a:schemeClr val="tx1">
-                    <a:lumMod val="75000"/>
-                    <a:lumOff val="25000"/>
-                  </a:schemeClr>
-                </a:solidFill>
-                <a:latin typeface="+mn-lt"/>
-                <a:ea typeface="+mn-ea"/>
-                <a:cs typeface="+mn-cs"/>
-              </a:defRPr>
-            </a:lvl4pPr>
-            <a:lvl5pPr marL="2057400" indent="-228600" algn="l" defTabSz="457200" rtl="0" eaLnBrk="1" latinLnBrk="0" hangingPunct="1">
-              <a:spcBef>
-                <a:spcPts val="1000"/>
-              </a:spcBef>
-              <a:spcAft>
-                <a:spcPts val="0"/>
-              </a:spcAft>
-              <a:buClr>
-                <a:schemeClr val="accent1"/>
-              </a:buClr>
-              <a:buFont typeface="Wingdings 3" charset="2"/>
-              <a:buChar char=""/>
-              <a:defRPr sz="1200" kern="1200">
-                <a:solidFill>
-                  <a:schemeClr val="tx1">
-                    <a:lumMod val="75000"/>
-                    <a:lumOff val="25000"/>
-                  </a:schemeClr>
-                </a:solidFill>
-                <a:latin typeface="+mn-lt"/>
-                <a:ea typeface="+mn-ea"/>
-                <a:cs typeface="+mn-cs"/>
-              </a:defRPr>
-            </a:lvl5pPr>
-            <a:lvl6pPr marL="2514600" indent="-228600" algn="l" defTabSz="457200" rtl="0" eaLnBrk="1" latinLnBrk="0" hangingPunct="1">
-              <a:spcBef>
-                <a:spcPts val="1000"/>
-              </a:spcBef>
-              <a:spcAft>
-                <a:spcPts val="0"/>
-              </a:spcAft>
-              <a:buClr>
-                <a:schemeClr val="accent1"/>
-              </a:buClr>
-              <a:buFont typeface="Wingdings 3" charset="2"/>
-              <a:buChar char=""/>
-              <a:defRPr sz="1200" kern="1200">
-                <a:solidFill>
-                  <a:schemeClr val="tx1">
-                    <a:lumMod val="75000"/>
-                    <a:lumOff val="25000"/>
-                  </a:schemeClr>
-                </a:solidFill>
-                <a:latin typeface="+mn-lt"/>
-                <a:ea typeface="+mn-ea"/>
-                <a:cs typeface="+mn-cs"/>
-              </a:defRPr>
-            </a:lvl6pPr>
-            <a:lvl7pPr marL="2971800" indent="-228600" algn="l" defTabSz="457200" rtl="0" eaLnBrk="1" latinLnBrk="0" hangingPunct="1">
-              <a:spcBef>
-                <a:spcPts val="1000"/>
-              </a:spcBef>
-              <a:spcAft>
-                <a:spcPts val="0"/>
-              </a:spcAft>
-              <a:buClr>
-                <a:schemeClr val="accent1"/>
-              </a:buClr>
-              <a:buFont typeface="Wingdings 3" charset="2"/>
-              <a:buChar char=""/>
-              <a:defRPr sz="1200" kern="1200">
-                <a:solidFill>
-                  <a:schemeClr val="tx1">
-                    <a:lumMod val="75000"/>
-                    <a:lumOff val="25000"/>
-                  </a:schemeClr>
-                </a:solidFill>
-                <a:latin typeface="+mn-lt"/>
-                <a:ea typeface="+mn-ea"/>
-                <a:cs typeface="+mn-cs"/>
-              </a:defRPr>
-            </a:lvl7pPr>
-            <a:lvl8pPr marL="3429000" indent="-228600" algn="l" defTabSz="457200" rtl="0" eaLnBrk="1" latinLnBrk="0" hangingPunct="1">
-              <a:spcBef>
-                <a:spcPts val="1000"/>
-              </a:spcBef>
-              <a:spcAft>
-                <a:spcPts val="0"/>
-              </a:spcAft>
-              <a:buClr>
-                <a:schemeClr val="accent1"/>
-              </a:buClr>
-              <a:buFont typeface="Wingdings 3" charset="2"/>
-              <a:buChar char=""/>
-              <a:defRPr sz="1200" kern="1200">
-                <a:solidFill>
-                  <a:schemeClr val="tx1">
-                    <a:lumMod val="75000"/>
-                    <a:lumOff val="25000"/>
-                  </a:schemeClr>
-                </a:solidFill>
-                <a:latin typeface="+mn-lt"/>
-                <a:ea typeface="+mn-ea"/>
-                <a:cs typeface="+mn-cs"/>
-              </a:defRPr>
-            </a:lvl8pPr>
-            <a:lvl9pPr marL="3886200" indent="-228600" algn="l" defTabSz="457200" rtl="0" eaLnBrk="1" latinLnBrk="0" hangingPunct="1">
-              <a:spcBef>
-                <a:spcPts val="1000"/>
-              </a:spcBef>
-              <a:spcAft>
-                <a:spcPts val="0"/>
-              </a:spcAft>
-              <a:buClr>
-                <a:schemeClr val="accent1"/>
-              </a:buClr>
-              <a:buFont typeface="Wingdings 3" charset="2"/>
-              <a:buChar char=""/>
-              <a:defRPr sz="1200" kern="1200">
-                <a:solidFill>
-                  <a:schemeClr val="tx1">
-                    <a:lumMod val="75000"/>
-                    <a:lumOff val="25000"/>
-                  </a:schemeClr>
-                </a:solidFill>
-                <a:latin typeface="+mn-lt"/>
-                <a:ea typeface="+mn-ea"/>
-                <a:cs typeface="+mn-cs"/>
-              </a:defRPr>
-            </a:lvl9pPr>
-          </a:lstStyle>
-          <a:p>
-            <a:r>
-              <a:rPr lang="en-US" dirty="0"/>
-              <a:t>Connected Sound to enemy hit</a:t>
-            </a:r>
-          </a:p>
-          <a:p>
-            <a:endParaRPr lang="en-US" dirty="0"/>
-          </a:p>
-          <a:p>
-            <a:pPr marL="0" indent="0">
-              <a:buFont typeface="Wingdings 3" charset="2"/>
-              <a:buNone/>
-            </a:pPr>
-            <a:endParaRPr lang="en-US" dirty="0"/>
-          </a:p>
-        </p:txBody>
-      </p:sp>
-    </p:spTree>
-    <p:extLst>
-      <p:ext uri="{BB962C8B-B14F-4D97-AF65-F5344CB8AC3E}">
-        <p14:creationId xmlns:p14="http://schemas.microsoft.com/office/powerpoint/2010/main" val="3123495901"/>
       </p:ext>
     </p:extLst>
   </p:cSld>

</xml_diff>